<commit_message>
update site layout sketches and save as pdf
</commit_message>
<xml_diff>
--- a/Lesson-7-Assignment-Sketches-for-layout.pptx
+++ b/Lesson-7-Assignment-Sketches-for-layout.pptx
@@ -109,6 +109,11 @@
       </a:defRPr>
     </a:lvl9pPr>
   </p:defaultTextStyle>
+  <p:extLst>
+    <p:ext uri="{EFAFB233-063F-42B5-8137-9DF3F51BA10A}">
+      <p15:sldGuideLst xmlns:p15="http://schemas.microsoft.com/office/powerpoint/2012/main"/>
+    </p:ext>
+  </p:extLst>
 </p:presentation>
 </file>
 
@@ -702,7 +707,7 @@
           <a:p>
             <a:fld id="{78B5BA10-22EC-7E43-B91A-3FB311B3C72F}" type="datetimeFigureOut">
               <a:rPr lang="en-US" smtClean="0"/>
-              <a:t>2/25/21</a:t>
+              <a:t>3/1/21</a:t>
             </a:fld>
             <a:endParaRPr lang="en-US"/>
           </a:p>
@@ -872,7 +877,7 @@
           <a:p>
             <a:fld id="{78B5BA10-22EC-7E43-B91A-3FB311B3C72F}" type="datetimeFigureOut">
               <a:rPr lang="en-US" smtClean="0"/>
-              <a:t>2/25/21</a:t>
+              <a:t>3/1/21</a:t>
             </a:fld>
             <a:endParaRPr lang="en-US"/>
           </a:p>
@@ -1052,7 +1057,7 @@
           <a:p>
             <a:fld id="{78B5BA10-22EC-7E43-B91A-3FB311B3C72F}" type="datetimeFigureOut">
               <a:rPr lang="en-US" smtClean="0"/>
-              <a:t>2/25/21</a:t>
+              <a:t>3/1/21</a:t>
             </a:fld>
             <a:endParaRPr lang="en-US"/>
           </a:p>
@@ -1222,7 +1227,7 @@
           <a:p>
             <a:fld id="{78B5BA10-22EC-7E43-B91A-3FB311B3C72F}" type="datetimeFigureOut">
               <a:rPr lang="en-US" smtClean="0"/>
-              <a:t>2/25/21</a:t>
+              <a:t>3/1/21</a:t>
             </a:fld>
             <a:endParaRPr lang="en-US"/>
           </a:p>
@@ -1466,7 +1471,7 @@
           <a:p>
             <a:fld id="{78B5BA10-22EC-7E43-B91A-3FB311B3C72F}" type="datetimeFigureOut">
               <a:rPr lang="en-US" smtClean="0"/>
-              <a:t>2/25/21</a:t>
+              <a:t>3/1/21</a:t>
             </a:fld>
             <a:endParaRPr lang="en-US"/>
           </a:p>
@@ -1698,7 +1703,7 @@
           <a:p>
             <a:fld id="{78B5BA10-22EC-7E43-B91A-3FB311B3C72F}" type="datetimeFigureOut">
               <a:rPr lang="en-US" smtClean="0"/>
-              <a:t>2/25/21</a:t>
+              <a:t>3/1/21</a:t>
             </a:fld>
             <a:endParaRPr lang="en-US"/>
           </a:p>
@@ -2065,7 +2070,7 @@
           <a:p>
             <a:fld id="{78B5BA10-22EC-7E43-B91A-3FB311B3C72F}" type="datetimeFigureOut">
               <a:rPr lang="en-US" smtClean="0"/>
-              <a:t>2/25/21</a:t>
+              <a:t>3/1/21</a:t>
             </a:fld>
             <a:endParaRPr lang="en-US"/>
           </a:p>
@@ -2183,7 +2188,7 @@
           <a:p>
             <a:fld id="{78B5BA10-22EC-7E43-B91A-3FB311B3C72F}" type="datetimeFigureOut">
               <a:rPr lang="en-US" smtClean="0"/>
-              <a:t>2/25/21</a:t>
+              <a:t>3/1/21</a:t>
             </a:fld>
             <a:endParaRPr lang="en-US"/>
           </a:p>
@@ -2278,7 +2283,7 @@
           <a:p>
             <a:fld id="{78B5BA10-22EC-7E43-B91A-3FB311B3C72F}" type="datetimeFigureOut">
               <a:rPr lang="en-US" smtClean="0"/>
-              <a:t>2/25/21</a:t>
+              <a:t>3/1/21</a:t>
             </a:fld>
             <a:endParaRPr lang="en-US"/>
           </a:p>
@@ -2555,7 +2560,7 @@
           <a:p>
             <a:fld id="{78B5BA10-22EC-7E43-B91A-3FB311B3C72F}" type="datetimeFigureOut">
               <a:rPr lang="en-US" smtClean="0"/>
-              <a:t>2/25/21</a:t>
+              <a:t>3/1/21</a:t>
             </a:fld>
             <a:endParaRPr lang="en-US"/>
           </a:p>
@@ -2812,7 +2817,7 @@
           <a:p>
             <a:fld id="{78B5BA10-22EC-7E43-B91A-3FB311B3C72F}" type="datetimeFigureOut">
               <a:rPr lang="en-US" smtClean="0"/>
-              <a:t>2/25/21</a:t>
+              <a:t>3/1/21</a:t>
             </a:fld>
             <a:endParaRPr lang="en-US"/>
           </a:p>
@@ -3025,7 +3030,7 @@
           <a:p>
             <a:fld id="{78B5BA10-22EC-7E43-B91A-3FB311B3C72F}" type="datetimeFigureOut">
               <a:rPr lang="en-US" smtClean="0"/>
-              <a:t>2/25/21</a:t>
+              <a:t>3/1/21</a:t>
             </a:fld>
             <a:endParaRPr lang="en-US"/>
           </a:p>
@@ -5616,8 +5621,8 @@
             <a:chExt cx="1513800" cy="167760"/>
           </a:xfrm>
         </p:grpSpPr>
-        <mc:AlternateContent xmlns:mc="http://schemas.openxmlformats.org/markup-compatibility/2006">
-          <mc:Choice xmlns:p14="http://schemas.microsoft.com/office/powerpoint/2010/main" Requires="p14">
+        <mc:AlternateContent xmlns:mc="http://schemas.openxmlformats.org/markup-compatibility/2006" xmlns:p14="http://schemas.microsoft.com/office/powerpoint/2010/main">
+          <mc:Choice Requires="p14">
             <p:contentPart p14:bwMode="auto" r:id="rId2">
               <p14:nvContentPartPr>
                 <p14:cNvPr id="43" name="Ink 42">
@@ -5636,7 +5641,7 @@
               </p14:xfrm>
             </p:contentPart>
           </mc:Choice>
-          <mc:Fallback>
+          <mc:Fallback xmlns="">
             <p:pic>
               <p:nvPicPr>
                 <p:cNvPr id="43" name="Ink 42">
@@ -5667,8 +5672,8 @@
             </p:pic>
           </mc:Fallback>
         </mc:AlternateContent>
-        <mc:AlternateContent xmlns:mc="http://schemas.openxmlformats.org/markup-compatibility/2006">
-          <mc:Choice xmlns:p14="http://schemas.microsoft.com/office/powerpoint/2010/main" Requires="p14">
+        <mc:AlternateContent xmlns:mc="http://schemas.openxmlformats.org/markup-compatibility/2006" xmlns:p14="http://schemas.microsoft.com/office/powerpoint/2010/main">
+          <mc:Choice Requires="p14">
             <p:contentPart p14:bwMode="auto" r:id="rId4">
               <p14:nvContentPartPr>
                 <p14:cNvPr id="44" name="Ink 43">
@@ -5687,7 +5692,7 @@
               </p14:xfrm>
             </p:contentPart>
           </mc:Choice>
-          <mc:Fallback>
+          <mc:Fallback xmlns="">
             <p:pic>
               <p:nvPicPr>
                 <p:cNvPr id="44" name="Ink 43">
@@ -5719,8 +5724,8 @@
           </mc:Fallback>
         </mc:AlternateContent>
       </p:grpSp>
-      <mc:AlternateContent xmlns:mc="http://schemas.openxmlformats.org/markup-compatibility/2006">
-        <mc:Choice xmlns:p14="http://schemas.microsoft.com/office/powerpoint/2010/main" Requires="p14">
+      <mc:AlternateContent xmlns:mc="http://schemas.openxmlformats.org/markup-compatibility/2006" xmlns:p14="http://schemas.microsoft.com/office/powerpoint/2010/main">
+        <mc:Choice Requires="p14">
           <p:contentPart p14:bwMode="auto" r:id="rId6">
             <p14:nvContentPartPr>
               <p14:cNvPr id="46" name="Ink 45">
@@ -5739,7 +5744,7 @@
             </p14:xfrm>
           </p:contentPart>
         </mc:Choice>
-        <mc:Fallback>
+        <mc:Fallback xmlns="">
           <p:pic>
             <p:nvPicPr>
               <p:cNvPr id="46" name="Ink 45">
@@ -5770,8 +5775,8 @@
           </p:pic>
         </mc:Fallback>
       </mc:AlternateContent>
-      <mc:AlternateContent xmlns:mc="http://schemas.openxmlformats.org/markup-compatibility/2006">
-        <mc:Choice xmlns:p14="http://schemas.microsoft.com/office/powerpoint/2010/main" Requires="p14">
+      <mc:AlternateContent xmlns:mc="http://schemas.openxmlformats.org/markup-compatibility/2006" xmlns:p14="http://schemas.microsoft.com/office/powerpoint/2010/main">
+        <mc:Choice Requires="p14">
           <p:contentPart p14:bwMode="auto" r:id="rId8">
             <p14:nvContentPartPr>
               <p14:cNvPr id="47" name="Ink 46">
@@ -5790,7 +5795,7 @@
             </p14:xfrm>
           </p:contentPart>
         </mc:Choice>
-        <mc:Fallback>
+        <mc:Fallback xmlns="">
           <p:pic>
             <p:nvPicPr>
               <p:cNvPr id="47" name="Ink 46">
@@ -5821,8 +5826,8 @@
           </p:pic>
         </mc:Fallback>
       </mc:AlternateContent>
-      <mc:AlternateContent xmlns:mc="http://schemas.openxmlformats.org/markup-compatibility/2006">
-        <mc:Choice xmlns:p14="http://schemas.microsoft.com/office/powerpoint/2010/main" Requires="p14">
+      <mc:AlternateContent xmlns:mc="http://schemas.openxmlformats.org/markup-compatibility/2006" xmlns:p14="http://schemas.microsoft.com/office/powerpoint/2010/main">
+        <mc:Choice Requires="p14">
           <p:contentPart p14:bwMode="auto" r:id="rId10">
             <p14:nvContentPartPr>
               <p14:cNvPr id="48" name="Ink 47">
@@ -5841,7 +5846,7 @@
             </p14:xfrm>
           </p:contentPart>
         </mc:Choice>
-        <mc:Fallback>
+        <mc:Fallback xmlns="">
           <p:pic>
             <p:nvPicPr>
               <p:cNvPr id="48" name="Ink 47">
@@ -5872,8 +5877,8 @@
           </p:pic>
         </mc:Fallback>
       </mc:AlternateContent>
-      <mc:AlternateContent xmlns:mc="http://schemas.openxmlformats.org/markup-compatibility/2006">
-        <mc:Choice xmlns:p14="http://schemas.microsoft.com/office/powerpoint/2010/main" Requires="p14">
+      <mc:AlternateContent xmlns:mc="http://schemas.openxmlformats.org/markup-compatibility/2006" xmlns:p14="http://schemas.microsoft.com/office/powerpoint/2010/main">
+        <mc:Choice Requires="p14">
           <p:contentPart p14:bwMode="auto" r:id="rId12">
             <p14:nvContentPartPr>
               <p14:cNvPr id="49" name="Ink 48">
@@ -5892,7 +5897,7 @@
             </p14:xfrm>
           </p:contentPart>
         </mc:Choice>
-        <mc:Fallback>
+        <mc:Fallback xmlns="">
           <p:pic>
             <p:nvPicPr>
               <p:cNvPr id="49" name="Ink 48">
@@ -5923,8 +5928,8 @@
           </p:pic>
         </mc:Fallback>
       </mc:AlternateContent>
-      <mc:AlternateContent xmlns:mc="http://schemas.openxmlformats.org/markup-compatibility/2006">
-        <mc:Choice xmlns:p14="http://schemas.microsoft.com/office/powerpoint/2010/main" Requires="p14">
+      <mc:AlternateContent xmlns:mc="http://schemas.openxmlformats.org/markup-compatibility/2006" xmlns:p14="http://schemas.microsoft.com/office/powerpoint/2010/main">
+        <mc:Choice Requires="p14">
           <p:contentPart p14:bwMode="auto" r:id="rId14">
             <p14:nvContentPartPr>
               <p14:cNvPr id="50" name="Ink 49">
@@ -5943,7 +5948,7 @@
             </p14:xfrm>
           </p:contentPart>
         </mc:Choice>
-        <mc:Fallback>
+        <mc:Fallback xmlns="">
           <p:pic>
             <p:nvPicPr>
               <p:cNvPr id="50" name="Ink 49">
@@ -5974,8 +5979,8 @@
           </p:pic>
         </mc:Fallback>
       </mc:AlternateContent>
-      <mc:AlternateContent xmlns:mc="http://schemas.openxmlformats.org/markup-compatibility/2006">
-        <mc:Choice xmlns:p14="http://schemas.microsoft.com/office/powerpoint/2010/main" Requires="p14">
+      <mc:AlternateContent xmlns:mc="http://schemas.openxmlformats.org/markup-compatibility/2006" xmlns:p14="http://schemas.microsoft.com/office/powerpoint/2010/main">
+        <mc:Choice Requires="p14">
           <p:contentPart p14:bwMode="auto" r:id="rId16">
             <p14:nvContentPartPr>
               <p14:cNvPr id="54" name="Ink 53">
@@ -5994,7 +5999,7 @@
             </p14:xfrm>
           </p:contentPart>
         </mc:Choice>
-        <mc:Fallback>
+        <mc:Fallback xmlns="">
           <p:pic>
             <p:nvPicPr>
               <p:cNvPr id="54" name="Ink 53">
@@ -6025,8 +6030,8 @@
           </p:pic>
         </mc:Fallback>
       </mc:AlternateContent>
-      <mc:AlternateContent xmlns:mc="http://schemas.openxmlformats.org/markup-compatibility/2006">
-        <mc:Choice xmlns:p14="http://schemas.microsoft.com/office/powerpoint/2010/main" Requires="p14">
+      <mc:AlternateContent xmlns:mc="http://schemas.openxmlformats.org/markup-compatibility/2006" xmlns:p14="http://schemas.microsoft.com/office/powerpoint/2010/main">
+        <mc:Choice Requires="p14">
           <p:contentPart p14:bwMode="auto" r:id="rId18">
             <p14:nvContentPartPr>
               <p14:cNvPr id="55" name="Ink 54">
@@ -6045,7 +6050,7 @@
             </p14:xfrm>
           </p:contentPart>
         </mc:Choice>
-        <mc:Fallback>
+        <mc:Fallback xmlns="">
           <p:pic>
             <p:nvPicPr>
               <p:cNvPr id="55" name="Ink 54">
@@ -6096,8 +6101,8 @@
             <a:chExt cx="3146040" cy="1317240"/>
           </a:xfrm>
         </p:grpSpPr>
-        <mc:AlternateContent xmlns:mc="http://schemas.openxmlformats.org/markup-compatibility/2006">
-          <mc:Choice xmlns:p14="http://schemas.microsoft.com/office/powerpoint/2010/main" Requires="p14">
+        <mc:AlternateContent xmlns:mc="http://schemas.openxmlformats.org/markup-compatibility/2006" xmlns:p14="http://schemas.microsoft.com/office/powerpoint/2010/main">
+          <mc:Choice Requires="p14">
             <p:contentPart p14:bwMode="auto" r:id="rId20">
               <p14:nvContentPartPr>
                 <p14:cNvPr id="51" name="Ink 50">
@@ -6116,7 +6121,7 @@
               </p14:xfrm>
             </p:contentPart>
           </mc:Choice>
-          <mc:Fallback>
+          <mc:Fallback xmlns="">
             <p:pic>
               <p:nvPicPr>
                 <p:cNvPr id="51" name="Ink 50">
@@ -6147,8 +6152,8 @@
             </p:pic>
           </mc:Fallback>
         </mc:AlternateContent>
-        <mc:AlternateContent xmlns:mc="http://schemas.openxmlformats.org/markup-compatibility/2006">
-          <mc:Choice xmlns:p14="http://schemas.microsoft.com/office/powerpoint/2010/main" Requires="p14">
+        <mc:AlternateContent xmlns:mc="http://schemas.openxmlformats.org/markup-compatibility/2006" xmlns:p14="http://schemas.microsoft.com/office/powerpoint/2010/main">
+          <mc:Choice Requires="p14">
             <p:contentPart p14:bwMode="auto" r:id="rId22">
               <p14:nvContentPartPr>
                 <p14:cNvPr id="52" name="Ink 51">
@@ -6167,7 +6172,7 @@
               </p14:xfrm>
             </p:contentPart>
           </mc:Choice>
-          <mc:Fallback>
+          <mc:Fallback xmlns="">
             <p:pic>
               <p:nvPicPr>
                 <p:cNvPr id="52" name="Ink 51">
@@ -6198,8 +6203,8 @@
             </p:pic>
           </mc:Fallback>
         </mc:AlternateContent>
-        <mc:AlternateContent xmlns:mc="http://schemas.openxmlformats.org/markup-compatibility/2006">
-          <mc:Choice xmlns:p14="http://schemas.microsoft.com/office/powerpoint/2010/main" Requires="p14">
+        <mc:AlternateContent xmlns:mc="http://schemas.openxmlformats.org/markup-compatibility/2006" xmlns:p14="http://schemas.microsoft.com/office/powerpoint/2010/main">
+          <mc:Choice Requires="p14">
             <p:contentPart p14:bwMode="auto" r:id="rId24">
               <p14:nvContentPartPr>
                 <p14:cNvPr id="56" name="Ink 55">
@@ -6218,7 +6223,7 @@
               </p14:xfrm>
             </p:contentPart>
           </mc:Choice>
-          <mc:Fallback>
+          <mc:Fallback xmlns="">
             <p:pic>
               <p:nvPicPr>
                 <p:cNvPr id="56" name="Ink 55">
@@ -6250,8 +6255,8 @@
           </mc:Fallback>
         </mc:AlternateContent>
       </p:grpSp>
-      <mc:AlternateContent xmlns:mc="http://schemas.openxmlformats.org/markup-compatibility/2006">
-        <mc:Choice xmlns:p14="http://schemas.microsoft.com/office/powerpoint/2010/main" Requires="p14">
+      <mc:AlternateContent xmlns:mc="http://schemas.openxmlformats.org/markup-compatibility/2006" xmlns:p14="http://schemas.microsoft.com/office/powerpoint/2010/main">
+        <mc:Choice Requires="p14">
           <p:contentPart p14:bwMode="auto" r:id="rId26">
             <p14:nvContentPartPr>
               <p14:cNvPr id="58" name="Ink 57">
@@ -6270,7 +6275,7 @@
             </p14:xfrm>
           </p:contentPart>
         </mc:Choice>
-        <mc:Fallback>
+        <mc:Fallback xmlns="">
           <p:pic>
             <p:nvPicPr>
               <p:cNvPr id="58" name="Ink 57">
@@ -7334,8 +7339,8 @@
           </a:p>
         </p:txBody>
       </p:sp>
-      <mc:AlternateContent xmlns:mc="http://schemas.openxmlformats.org/markup-compatibility/2006">
-        <mc:Choice xmlns:p14="http://schemas.microsoft.com/office/powerpoint/2010/main" Requires="p14">
+      <mc:AlternateContent xmlns:mc="http://schemas.openxmlformats.org/markup-compatibility/2006" xmlns:p14="http://schemas.microsoft.com/office/powerpoint/2010/main">
+        <mc:Choice Requires="p14">
           <p:contentPart p14:bwMode="auto" r:id="rId2">
             <p14:nvContentPartPr>
               <p14:cNvPr id="18" name="Ink 17">
@@ -7354,7 +7359,7 @@
             </p14:xfrm>
           </p:contentPart>
         </mc:Choice>
-        <mc:Fallback>
+        <mc:Fallback xmlns="">
           <p:pic>
             <p:nvPicPr>
               <p:cNvPr id="18" name="Ink 17">
@@ -9780,8 +9785,8 @@
           </a:p>
         </p:txBody>
       </p:sp>
-      <mc:AlternateContent xmlns:mc="http://schemas.openxmlformats.org/markup-compatibility/2006">
-        <mc:Choice xmlns:p14="http://schemas.microsoft.com/office/powerpoint/2010/main" Requires="p14">
+      <mc:AlternateContent xmlns:mc="http://schemas.openxmlformats.org/markup-compatibility/2006" xmlns:p14="http://schemas.microsoft.com/office/powerpoint/2010/main">
+        <mc:Choice Requires="p14">
           <p:contentPart p14:bwMode="auto" r:id="rId2">
             <p14:nvContentPartPr>
               <p14:cNvPr id="13" name="Ink 12">
@@ -9800,7 +9805,7 @@
             </p14:xfrm>
           </p:contentPart>
         </mc:Choice>
-        <mc:Fallback>
+        <mc:Fallback xmlns="">
           <p:pic>
             <p:nvPicPr>
               <p:cNvPr id="13" name="Ink 12">
@@ -11439,8 +11444,8 @@
           </a:p>
         </p:txBody>
       </p:sp>
-      <mc:AlternateContent xmlns:mc="http://schemas.openxmlformats.org/markup-compatibility/2006">
-        <mc:Choice xmlns:p14="http://schemas.microsoft.com/office/powerpoint/2010/main" Requires="p14">
+      <mc:AlternateContent xmlns:mc="http://schemas.openxmlformats.org/markup-compatibility/2006" xmlns:p14="http://schemas.microsoft.com/office/powerpoint/2010/main">
+        <mc:Choice Requires="p14">
           <p:contentPart p14:bwMode="auto" r:id="rId2">
             <p14:nvContentPartPr>
               <p14:cNvPr id="9" name="Ink 8">
@@ -11459,7 +11464,7 @@
             </p14:xfrm>
           </p:contentPart>
         </mc:Choice>
-        <mc:Fallback>
+        <mc:Fallback xmlns="">
           <p:pic>
             <p:nvPicPr>
               <p:cNvPr id="9" name="Ink 8">
@@ -12748,14 +12753,6 @@
               <a:t>Cost:</a:t>
             </a:r>
           </a:p>
-          <a:p>
-            <a:r>
-              <a:rPr lang="en-US" sz="900" b="1" dirty="0">
-                <a:latin typeface="Times New Roman" panose="02020603050405020304" pitchFamily="18" charset="0"/>
-              </a:rPr>
-              <a:t>Other information:</a:t>
-            </a:r>
-          </a:p>
         </p:txBody>
       </p:sp>
       <p:sp>
@@ -12908,14 +12905,6 @@
               <a:t>Cost:</a:t>
             </a:r>
           </a:p>
-          <a:p>
-            <a:r>
-              <a:rPr lang="en-US" sz="900" b="1" dirty="0">
-                <a:latin typeface="Times New Roman" panose="02020603050405020304" pitchFamily="18" charset="0"/>
-              </a:rPr>
-              <a:t>Other Information:</a:t>
-            </a:r>
-          </a:p>
         </p:txBody>
       </p:sp>
       <p:sp>
@@ -13066,14 +13055,6 @@
                 <a:latin typeface="Times New Roman" panose="02020603050405020304" pitchFamily="18" charset="0"/>
               </a:rPr>
               <a:t>Cost:</a:t>
-            </a:r>
-          </a:p>
-          <a:p>
-            <a:r>
-              <a:rPr lang="en-US" sz="900" b="1" dirty="0">
-                <a:latin typeface="Times New Roman" panose="02020603050405020304" pitchFamily="18" charset="0"/>
-              </a:rPr>
-              <a:t>Other Information:</a:t>
             </a:r>
           </a:p>
         </p:txBody>
@@ -13811,8 +13792,8 @@
           </a:p>
         </p:txBody>
       </p:sp>
-      <mc:AlternateContent xmlns:mc="http://schemas.openxmlformats.org/markup-compatibility/2006">
-        <mc:Choice xmlns:p14="http://schemas.microsoft.com/office/powerpoint/2010/main" Requires="p14">
+      <mc:AlternateContent xmlns:mc="http://schemas.openxmlformats.org/markup-compatibility/2006" xmlns:p14="http://schemas.microsoft.com/office/powerpoint/2010/main">
+        <mc:Choice Requires="p14">
           <p:contentPart p14:bwMode="auto" r:id="rId2">
             <p14:nvContentPartPr>
               <p14:cNvPr id="9" name="Ink 8">
@@ -13831,7 +13812,7 @@
             </p14:xfrm>
           </p:contentPart>
         </mc:Choice>
-        <mc:Fallback>
+        <mc:Fallback xmlns="">
           <p:pic>
             <p:nvPicPr>
               <p:cNvPr id="9" name="Ink 8">

</xml_diff>